<commit_message>
Update H3 Databases en Beveiliging - Dynamische Websites.pptx
</commit_message>
<xml_diff>
--- a/H3 - Databases en Beveiliging/Presentatie/H3 Databases en Beveiliging - Dynamische Websites.pptx
+++ b/H3 - Databases en Beveiliging/Presentatie/H3 Databases en Beveiliging - Dynamische Websites.pptx
@@ -142,6 +142,7 @@
 <p1510:revInfo xmlns:a="http://schemas.openxmlformats.org/drawingml/2006/main" xmlns:r="http://schemas.openxmlformats.org/officeDocument/2006/relationships" xmlns:p1510="http://schemas.microsoft.com/office/powerpoint/2015/10/main">
   <p1510:revLst>
     <p1510:client id="{C6E7D8E5-334B-6BED-3A15-C50C85D7133C}" v="2733" dt="2025-11-05T14:12:54.596"/>
+    <p1510:client id="{E5F3F909-AD2C-F04E-F173-6FF068CB45DB}" v="54" dt="2025-11-05T20:45:33.113"/>
     <p1510:client id="{E9627F19-914F-3B8E-9AE0-EB1A5D63F7B9}" v="7401" dt="2025-11-05T20:29:13.609"/>
   </p1510:revLst>
 </p1510:revInfo>
@@ -229,7 +230,7 @@
           <a:p>
             <a:fld id="{6706355E-35B0-47A6-8E00-D68DE081856C}" type="datetimeFigureOut">
               <a:rPr lang="nl-BE" smtClean="0"/>
-              <a:t>5/11/2025</a:t>
+              <a:t>6/11/2025</a:t>
             </a:fld>
             <a:endParaRPr lang="nl-BE"/>
           </a:p>
@@ -388,7 +389,7 @@
           <a:p>
             <a:fld id="{39DBD449-D42A-4711-8837-53EC15580D9C}" type="slidenum">
               <a:rPr lang="nl-BE" smtClean="0"/>
-              <a:t>‹nr.›</a:t>
+              <a:t>‹#›</a:t>
             </a:fld>
             <a:endParaRPr lang="nl-BE"/>
           </a:p>
@@ -689,7 +690,7 @@
           <a:p>
             <a:fld id="{39DBD449-D42A-4711-8837-53EC15580D9C}" type="slidenum">
               <a:rPr lang="nl-BE" smtClean="0"/>
-              <a:t>21</a:t>
+              <a:t>24</a:t>
             </a:fld>
             <a:endParaRPr lang="nl-BE"/>
           </a:p>
@@ -859,7 +860,7 @@
           <a:p>
             <a:fld id="{C128FA71-3A18-48C0-980F-4B68F7F63042}" type="datetime1">
               <a:rPr lang="en-US" smtClean="0"/>
-              <a:t>11/5/2025</a:t>
+              <a:t>11/6/2025</a:t>
             </a:fld>
             <a:endParaRPr lang="en-US"/>
           </a:p>
@@ -913,7 +914,7 @@
           <a:p>
             <a:fld id="{CC057153-B650-4DEB-B370-79DDCFDCE934}" type="slidenum">
               <a:rPr lang="en-US" smtClean="0"/>
-              <a:t>‹nr.›</a:t>
+              <a:t>‹#›</a:t>
             </a:fld>
             <a:endParaRPr lang="en-US"/>
           </a:p>
@@ -929,13 +930,13 @@
   <p:clrMapOvr>
     <a:masterClrMapping/>
   </p:clrMapOvr>
-  <mc:AlternateContent xmlns:mc="http://schemas.openxmlformats.org/markup-compatibility/2006">
-    <mc:Choice xmlns:p14="http://schemas.microsoft.com/office/powerpoint/2010/main" Requires="p14">
+  <mc:AlternateContent xmlns:mc="http://schemas.openxmlformats.org/markup-compatibility/2006" xmlns:p14="http://schemas.microsoft.com/office/powerpoint/2010/main">
+    <mc:Choice Requires="p14">
       <p:transition spd="slow" p14:dur="4000">
         <p14:vortex dir="u"/>
       </p:transition>
     </mc:Choice>
-    <mc:Fallback>
+    <mc:Fallback xmlns="">
       <p:transition spd="slow">
         <p:fade/>
       </p:transition>
@@ -1079,7 +1080,7 @@
           <a:p>
             <a:fld id="{7104EDB3-C0E8-45F8-9E1D-1B6C8D1880C0}" type="datetime1">
               <a:rPr lang="en-US" smtClean="0"/>
-              <a:t>11/5/2025</a:t>
+              <a:t>11/6/2025</a:t>
             </a:fld>
             <a:endParaRPr lang="en-US"/>
           </a:p>
@@ -1133,7 +1134,7 @@
           <a:p>
             <a:fld id="{CC057153-B650-4DEB-B370-79DDCFDCE934}" type="slidenum">
               <a:rPr lang="en-US" smtClean="0"/>
-              <a:t>‹nr.›</a:t>
+              <a:t>‹#›</a:t>
             </a:fld>
             <a:endParaRPr lang="en-US"/>
           </a:p>
@@ -1149,13 +1150,13 @@
   <p:clrMapOvr>
     <a:masterClrMapping/>
   </p:clrMapOvr>
-  <mc:AlternateContent xmlns:mc="http://schemas.openxmlformats.org/markup-compatibility/2006">
-    <mc:Choice xmlns:p14="http://schemas.microsoft.com/office/powerpoint/2010/main" Requires="p14">
+  <mc:AlternateContent xmlns:mc="http://schemas.openxmlformats.org/markup-compatibility/2006" xmlns:p14="http://schemas.microsoft.com/office/powerpoint/2010/main">
+    <mc:Choice Requires="p14">
       <p:transition spd="slow" p14:dur="4000">
         <p14:vortex dir="u"/>
       </p:transition>
     </mc:Choice>
-    <mc:Fallback>
+    <mc:Fallback xmlns="">
       <p:transition spd="slow">
         <p:fade/>
       </p:transition>
@@ -1299,7 +1300,7 @@
           <a:p>
             <a:fld id="{9CF0EC4B-54ED-4041-B552-9BA760FA3DBA}" type="datetime1">
               <a:rPr lang="en-US" smtClean="0"/>
-              <a:t>11/5/2025</a:t>
+              <a:t>11/6/2025</a:t>
             </a:fld>
             <a:endParaRPr lang="en-US"/>
           </a:p>
@@ -1353,7 +1354,7 @@
           <a:p>
             <a:fld id="{CC057153-B650-4DEB-B370-79DDCFDCE934}" type="slidenum">
               <a:rPr lang="en-US" smtClean="0"/>
-              <a:t>‹nr.›</a:t>
+              <a:t>‹#›</a:t>
             </a:fld>
             <a:endParaRPr lang="en-US"/>
           </a:p>
@@ -1369,13 +1370,13 @@
   <p:clrMapOvr>
     <a:masterClrMapping/>
   </p:clrMapOvr>
-  <mc:AlternateContent xmlns:mc="http://schemas.openxmlformats.org/markup-compatibility/2006">
-    <mc:Choice xmlns:p14="http://schemas.microsoft.com/office/powerpoint/2010/main" Requires="p14">
+  <mc:AlternateContent xmlns:mc="http://schemas.openxmlformats.org/markup-compatibility/2006" xmlns:p14="http://schemas.microsoft.com/office/powerpoint/2010/main">
+    <mc:Choice Requires="p14">
       <p:transition spd="slow" p14:dur="4000">
         <p14:vortex dir="u"/>
       </p:transition>
     </mc:Choice>
-    <mc:Fallback>
+    <mc:Fallback xmlns="">
       <p:transition spd="slow">
         <p:fade/>
       </p:transition>
@@ -1509,7 +1510,7 @@
           <a:p>
             <a:fld id="{51C1210E-201E-4473-82AC-2466F5386C38}" type="datetime1">
               <a:rPr lang="en-US" smtClean="0"/>
-              <a:t>11/5/2025</a:t>
+              <a:t>11/6/2025</a:t>
             </a:fld>
             <a:endParaRPr lang="en-US"/>
           </a:p>
@@ -1563,7 +1564,7 @@
           <a:p>
             <a:fld id="{CC057153-B650-4DEB-B370-79DDCFDCE934}" type="slidenum">
               <a:rPr lang="en-US" smtClean="0"/>
-              <a:t>‹nr.›</a:t>
+              <a:t>‹#›</a:t>
             </a:fld>
             <a:endParaRPr lang="en-US"/>
           </a:p>
@@ -1579,13 +1580,13 @@
   <p:clrMapOvr>
     <a:masterClrMapping/>
   </p:clrMapOvr>
-  <mc:AlternateContent xmlns:mc="http://schemas.openxmlformats.org/markup-compatibility/2006">
-    <mc:Choice xmlns:p14="http://schemas.microsoft.com/office/powerpoint/2010/main" Requires="p14">
+  <mc:AlternateContent xmlns:mc="http://schemas.openxmlformats.org/markup-compatibility/2006" xmlns:p14="http://schemas.microsoft.com/office/powerpoint/2010/main">
+    <mc:Choice Requires="p14">
       <p:transition spd="slow" p14:dur="4000">
         <p14:vortex dir="u"/>
       </p:transition>
     </mc:Choice>
-    <mc:Fallback>
+    <mc:Fallback xmlns="">
       <p:transition spd="slow">
         <p:fade/>
       </p:transition>
@@ -1798,7 +1799,7 @@
           <a:p>
             <a:fld id="{B01EA198-6CAB-4B8F-B93F-1F9C8C4B6CE7}" type="datetime1">
               <a:rPr lang="en-US" smtClean="0"/>
-              <a:t>11/5/2025</a:t>
+              <a:t>11/6/2025</a:t>
             </a:fld>
             <a:endParaRPr lang="en-US"/>
           </a:p>
@@ -1852,7 +1853,7 @@
           <a:p>
             <a:fld id="{CC057153-B650-4DEB-B370-79DDCFDCE934}" type="slidenum">
               <a:rPr lang="en-US" smtClean="0"/>
-              <a:t>‹nr.›</a:t>
+              <a:t>‹#›</a:t>
             </a:fld>
             <a:endParaRPr lang="en-US"/>
           </a:p>
@@ -1868,13 +1869,13 @@
   <p:clrMapOvr>
     <a:masterClrMapping/>
   </p:clrMapOvr>
-  <mc:AlternateContent xmlns:mc="http://schemas.openxmlformats.org/markup-compatibility/2006">
-    <mc:Choice xmlns:p14="http://schemas.microsoft.com/office/powerpoint/2010/main" Requires="p14">
+  <mc:AlternateContent xmlns:mc="http://schemas.openxmlformats.org/markup-compatibility/2006" xmlns:p14="http://schemas.microsoft.com/office/powerpoint/2010/main">
+    <mc:Choice Requires="p14">
       <p:transition spd="slow" p14:dur="4000">
         <p14:vortex dir="u"/>
       </p:transition>
     </mc:Choice>
-    <mc:Fallback>
+    <mc:Fallback xmlns="">
       <p:transition spd="slow">
         <p:fade/>
       </p:transition>
@@ -2080,7 +2081,7 @@
           <a:p>
             <a:fld id="{CA06041F-4525-44D5-AA4F-332294BF1F56}" type="datetime1">
               <a:rPr lang="en-US" smtClean="0"/>
-              <a:t>11/5/2025</a:t>
+              <a:t>11/6/2025</a:t>
             </a:fld>
             <a:endParaRPr lang="en-US"/>
           </a:p>
@@ -2134,7 +2135,7 @@
           <a:p>
             <a:fld id="{CC057153-B650-4DEB-B370-79DDCFDCE934}" type="slidenum">
               <a:rPr lang="en-US" smtClean="0"/>
-              <a:t>‹nr.›</a:t>
+              <a:t>‹#›</a:t>
             </a:fld>
             <a:endParaRPr lang="en-US"/>
           </a:p>
@@ -2150,13 +2151,13 @@
   <p:clrMapOvr>
     <a:masterClrMapping/>
   </p:clrMapOvr>
-  <mc:AlternateContent xmlns:mc="http://schemas.openxmlformats.org/markup-compatibility/2006">
-    <mc:Choice xmlns:p14="http://schemas.microsoft.com/office/powerpoint/2010/main" Requires="p14">
+  <mc:AlternateContent xmlns:mc="http://schemas.openxmlformats.org/markup-compatibility/2006" xmlns:p14="http://schemas.microsoft.com/office/powerpoint/2010/main">
+    <mc:Choice Requires="p14">
       <p:transition spd="slow" p14:dur="4000">
         <p14:vortex dir="u"/>
       </p:transition>
     </mc:Choice>
-    <mc:Fallback>
+    <mc:Fallback xmlns="">
       <p:transition spd="slow">
         <p:fade/>
       </p:transition>
@@ -2514,7 +2515,7 @@
           <a:p>
             <a:fld id="{F9557091-BBDF-4EB9-BA6B-2BB67AC4FC0F}" type="datetime1">
               <a:rPr lang="en-US" smtClean="0"/>
-              <a:t>11/5/2025</a:t>
+              <a:t>11/6/2025</a:t>
             </a:fld>
             <a:endParaRPr lang="en-US"/>
           </a:p>
@@ -2568,7 +2569,7 @@
           <a:p>
             <a:fld id="{CC057153-B650-4DEB-B370-79DDCFDCE934}" type="slidenum">
               <a:rPr lang="en-US" smtClean="0"/>
-              <a:t>‹nr.›</a:t>
+              <a:t>‹#›</a:t>
             </a:fld>
             <a:endParaRPr lang="en-US"/>
           </a:p>
@@ -2584,13 +2585,13 @@
   <p:clrMapOvr>
     <a:masterClrMapping/>
   </p:clrMapOvr>
-  <mc:AlternateContent xmlns:mc="http://schemas.openxmlformats.org/markup-compatibility/2006">
-    <mc:Choice xmlns:p14="http://schemas.microsoft.com/office/powerpoint/2010/main" Requires="p14">
+  <mc:AlternateContent xmlns:mc="http://schemas.openxmlformats.org/markup-compatibility/2006" xmlns:p14="http://schemas.microsoft.com/office/powerpoint/2010/main">
+    <mc:Choice Requires="p14">
       <p:transition spd="slow" p14:dur="4000">
         <p14:vortex dir="u"/>
       </p:transition>
     </mc:Choice>
-    <mc:Fallback>
+    <mc:Fallback xmlns="">
       <p:transition spd="slow">
         <p:fade/>
       </p:transition>
@@ -2667,7 +2668,7 @@
           <a:p>
             <a:fld id="{2D6B226B-77A6-410C-9796-083F278E0125}" type="datetime1">
               <a:rPr lang="en-US" smtClean="0"/>
-              <a:t>11/5/2025</a:t>
+              <a:t>11/6/2025</a:t>
             </a:fld>
             <a:endParaRPr lang="en-US"/>
           </a:p>
@@ -2721,7 +2722,7 @@
           <a:p>
             <a:fld id="{CC057153-B650-4DEB-B370-79DDCFDCE934}" type="slidenum">
               <a:rPr lang="en-US" smtClean="0"/>
-              <a:t>‹nr.›</a:t>
+              <a:t>‹#›</a:t>
             </a:fld>
             <a:endParaRPr lang="en-US"/>
           </a:p>
@@ -2737,13 +2738,13 @@
   <p:clrMapOvr>
     <a:masterClrMapping/>
   </p:clrMapOvr>
-  <mc:AlternateContent xmlns:mc="http://schemas.openxmlformats.org/markup-compatibility/2006">
-    <mc:Choice xmlns:p14="http://schemas.microsoft.com/office/powerpoint/2010/main" Requires="p14">
+  <mc:AlternateContent xmlns:mc="http://schemas.openxmlformats.org/markup-compatibility/2006" xmlns:p14="http://schemas.microsoft.com/office/powerpoint/2010/main">
+    <mc:Choice Requires="p14">
       <p:transition spd="slow" p14:dur="4000">
         <p14:vortex dir="u"/>
       </p:transition>
     </mc:Choice>
-    <mc:Fallback>
+    <mc:Fallback xmlns="">
       <p:transition spd="slow">
         <p:fade/>
       </p:transition>
@@ -2792,7 +2793,7 @@
           <a:p>
             <a:fld id="{A23A578B-D289-4C40-8593-3D356C49DA58}" type="datetime1">
               <a:rPr lang="en-US" smtClean="0"/>
-              <a:t>11/5/2025</a:t>
+              <a:t>11/6/2025</a:t>
             </a:fld>
             <a:endParaRPr lang="en-US"/>
           </a:p>
@@ -2846,7 +2847,7 @@
           <a:p>
             <a:fld id="{CC057153-B650-4DEB-B370-79DDCFDCE934}" type="slidenum">
               <a:rPr lang="en-US" smtClean="0"/>
-              <a:t>‹nr.›</a:t>
+              <a:t>‹#›</a:t>
             </a:fld>
             <a:endParaRPr lang="en-US"/>
           </a:p>
@@ -2862,13 +2863,13 @@
   <p:clrMapOvr>
     <a:masterClrMapping/>
   </p:clrMapOvr>
-  <mc:AlternateContent xmlns:mc="http://schemas.openxmlformats.org/markup-compatibility/2006">
-    <mc:Choice xmlns:p14="http://schemas.microsoft.com/office/powerpoint/2010/main" Requires="p14">
+  <mc:AlternateContent xmlns:mc="http://schemas.openxmlformats.org/markup-compatibility/2006" xmlns:p14="http://schemas.microsoft.com/office/powerpoint/2010/main">
+    <mc:Choice Requires="p14">
       <p:transition spd="slow" p14:dur="4000">
         <p14:vortex dir="u"/>
       </p:transition>
     </mc:Choice>
-    <mc:Fallback>
+    <mc:Fallback xmlns="">
       <p:transition spd="slow">
         <p:fade/>
       </p:transition>
@@ -3121,7 +3122,7 @@
           <a:p>
             <a:fld id="{713DFAE3-14DB-48A7-A80F-80DDB072CE3D}" type="datetime1">
               <a:rPr lang="en-US" smtClean="0"/>
-              <a:t>11/5/2025</a:t>
+              <a:t>11/6/2025</a:t>
             </a:fld>
             <a:endParaRPr lang="en-US"/>
           </a:p>
@@ -3175,7 +3176,7 @@
           <a:p>
             <a:fld id="{CC057153-B650-4DEB-B370-79DDCFDCE934}" type="slidenum">
               <a:rPr lang="en-US" smtClean="0"/>
-              <a:t>‹nr.›</a:t>
+              <a:t>‹#›</a:t>
             </a:fld>
             <a:endParaRPr lang="en-US"/>
           </a:p>
@@ -3191,13 +3192,13 @@
   <p:clrMapOvr>
     <a:masterClrMapping/>
   </p:clrMapOvr>
-  <mc:AlternateContent xmlns:mc="http://schemas.openxmlformats.org/markup-compatibility/2006">
-    <mc:Choice xmlns:p14="http://schemas.microsoft.com/office/powerpoint/2010/main" Requires="p14">
+  <mc:AlternateContent xmlns:mc="http://schemas.openxmlformats.org/markup-compatibility/2006" xmlns:p14="http://schemas.microsoft.com/office/powerpoint/2010/main">
+    <mc:Choice Requires="p14">
       <p:transition spd="slow" p14:dur="4000">
         <p14:vortex dir="u"/>
       </p:transition>
     </mc:Choice>
-    <mc:Fallback>
+    <mc:Fallback xmlns="">
       <p:transition spd="slow">
         <p:fade/>
       </p:transition>
@@ -3426,7 +3427,7 @@
           <a:p>
             <a:fld id="{92C5EAEF-6478-4102-8F5D-A5FE9FC97ACB}" type="datetime1">
               <a:rPr lang="en-US" smtClean="0"/>
-              <a:t>11/5/2025</a:t>
+              <a:t>11/6/2025</a:t>
             </a:fld>
             <a:endParaRPr lang="en-US"/>
           </a:p>
@@ -3480,7 +3481,7 @@
           <a:p>
             <a:fld id="{CC057153-B650-4DEB-B370-79DDCFDCE934}" type="slidenum">
               <a:rPr lang="en-US" smtClean="0"/>
-              <a:t>‹nr.›</a:t>
+              <a:t>‹#›</a:t>
             </a:fld>
             <a:endParaRPr lang="en-US"/>
           </a:p>
@@ -3496,13 +3497,13 @@
   <p:clrMapOvr>
     <a:masterClrMapping/>
   </p:clrMapOvr>
-  <mc:AlternateContent xmlns:mc="http://schemas.openxmlformats.org/markup-compatibility/2006">
-    <mc:Choice xmlns:p14="http://schemas.microsoft.com/office/powerpoint/2010/main" Requires="p14">
+  <mc:AlternateContent xmlns:mc="http://schemas.openxmlformats.org/markup-compatibility/2006" xmlns:p14="http://schemas.microsoft.com/office/powerpoint/2010/main">
+    <mc:Choice Requires="p14">
       <p:transition spd="slow" p14:dur="4000">
         <p14:vortex dir="u"/>
       </p:transition>
     </mc:Choice>
-    <mc:Fallback>
+    <mc:Fallback xmlns="">
       <p:transition spd="slow">
         <p:fade/>
       </p:transition>
@@ -3677,7 +3678,7 @@
           <a:p>
             <a:fld id="{67F45AC6-C491-4585-A584-9CE2AF7D5500}" type="datetime1">
               <a:rPr lang="en-US" smtClean="0"/>
-              <a:t>11/5/2025</a:t>
+              <a:t>11/6/2025</a:t>
             </a:fld>
             <a:endParaRPr lang="en-US"/>
           </a:p>
@@ -3763,7 +3764,7 @@
           <a:p>
             <a:fld id="{CC057153-B650-4DEB-B370-79DDCFDCE934}" type="slidenum">
               <a:rPr lang="en-US" smtClean="0"/>
-              <a:t>‹nr.›</a:t>
+              <a:t>‹#›</a:t>
             </a:fld>
             <a:endParaRPr lang="en-US"/>
           </a:p>
@@ -3790,13 +3791,13 @@
     <p:sldLayoutId id="2147483688" r:id="rId10"/>
     <p:sldLayoutId id="2147483690" r:id="rId11"/>
   </p:sldLayoutIdLst>
-  <mc:AlternateContent xmlns:mc="http://schemas.openxmlformats.org/markup-compatibility/2006">
-    <mc:Choice xmlns:p14="http://schemas.microsoft.com/office/powerpoint/2010/main" Requires="p14">
+  <mc:AlternateContent xmlns:mc="http://schemas.openxmlformats.org/markup-compatibility/2006" xmlns:p14="http://schemas.microsoft.com/office/powerpoint/2010/main">
+    <mc:Choice Requires="p14">
       <p:transition spd="slow" p14:dur="4000">
         <p14:vortex dir="u"/>
       </p:transition>
     </mc:Choice>
-    <mc:Fallback>
+    <mc:Fallback xmlns="">
       <p:transition spd="slow">
         <p:fade/>
       </p:transition>
@@ -4403,13 +4404,13 @@
   <p:clrMapOvr>
     <a:masterClrMapping/>
   </p:clrMapOvr>
-  <mc:AlternateContent xmlns:mc="http://schemas.openxmlformats.org/markup-compatibility/2006">
-    <mc:Choice xmlns:p14="http://schemas.microsoft.com/office/powerpoint/2010/main" Requires="p14">
+  <mc:AlternateContent xmlns:mc="http://schemas.openxmlformats.org/markup-compatibility/2006" xmlns:p14="http://schemas.microsoft.com/office/powerpoint/2010/main">
+    <mc:Choice Requires="p14">
       <p:transition spd="slow" p14:dur="4000">
         <p14:vortex dir="u"/>
       </p:transition>
     </mc:Choice>
-    <mc:Fallback>
+    <mc:Fallback xmlns="">
       <p:transition spd="slow">
         <p:fade/>
       </p:transition>
@@ -4722,13 +4723,13 @@
   <p:clrMapOvr>
     <a:masterClrMapping/>
   </p:clrMapOvr>
-  <mc:AlternateContent xmlns:mc="http://schemas.openxmlformats.org/markup-compatibility/2006">
-    <mc:Choice xmlns:p14="http://schemas.microsoft.com/office/powerpoint/2010/main" Requires="p14">
+  <mc:AlternateContent xmlns:mc="http://schemas.openxmlformats.org/markup-compatibility/2006" xmlns:p14="http://schemas.microsoft.com/office/powerpoint/2010/main">
+    <mc:Choice Requires="p14">
       <p:transition spd="slow" p14:dur="4000">
         <p14:vortex dir="u"/>
       </p:transition>
     </mc:Choice>
-    <mc:Fallback>
+    <mc:Fallback xmlns="">
       <p:transition spd="slow">
         <p:fade/>
       </p:transition>
@@ -5082,13 +5083,13 @@
   <p:clrMapOvr>
     <a:masterClrMapping/>
   </p:clrMapOvr>
-  <mc:AlternateContent xmlns:mc="http://schemas.openxmlformats.org/markup-compatibility/2006">
-    <mc:Choice xmlns:p14="http://schemas.microsoft.com/office/powerpoint/2010/main" Requires="p14">
+  <mc:AlternateContent xmlns:mc="http://schemas.openxmlformats.org/markup-compatibility/2006" xmlns:p14="http://schemas.microsoft.com/office/powerpoint/2010/main">
+    <mc:Choice Requires="p14">
       <p:transition spd="slow" p14:dur="4000">
         <p14:vortex dir="u"/>
       </p:transition>
     </mc:Choice>
-    <mc:Fallback>
+    <mc:Fallback xmlns="">
       <p:transition spd="slow">
         <p:fade/>
       </p:transition>
@@ -5683,13 +5684,13 @@
   <p:clrMapOvr>
     <a:masterClrMapping/>
   </p:clrMapOvr>
-  <mc:AlternateContent xmlns:mc="http://schemas.openxmlformats.org/markup-compatibility/2006">
-    <mc:Choice xmlns:p14="http://schemas.microsoft.com/office/powerpoint/2010/main" Requires="p14">
+  <mc:AlternateContent xmlns:mc="http://schemas.openxmlformats.org/markup-compatibility/2006" xmlns:p14="http://schemas.microsoft.com/office/powerpoint/2010/main">
+    <mc:Choice Requires="p14">
       <p:transition spd="slow" p14:dur="4000">
         <p14:vortex dir="u"/>
       </p:transition>
     </mc:Choice>
-    <mc:Fallback>
+    <mc:Fallback xmlns="">
       <p:transition spd="slow">
         <p:fade/>
       </p:transition>
@@ -6222,13 +6223,13 @@
   <p:clrMapOvr>
     <a:masterClrMapping/>
   </p:clrMapOvr>
-  <mc:AlternateContent xmlns:mc="http://schemas.openxmlformats.org/markup-compatibility/2006">
-    <mc:Choice xmlns:p14="http://schemas.microsoft.com/office/powerpoint/2010/main" Requires="p14">
+  <mc:AlternateContent xmlns:mc="http://schemas.openxmlformats.org/markup-compatibility/2006" xmlns:p14="http://schemas.microsoft.com/office/powerpoint/2010/main">
+    <mc:Choice Requires="p14">
       <p:transition spd="slow" p14:dur="4000">
         <p14:vortex dir="u"/>
       </p:transition>
     </mc:Choice>
-    <mc:Fallback>
+    <mc:Fallback xmlns="">
       <p:transition spd="slow">
         <p:fade/>
       </p:transition>
@@ -6975,13 +6976,13 @@
   <p:clrMapOvr>
     <a:masterClrMapping/>
   </p:clrMapOvr>
-  <mc:AlternateContent xmlns:mc="http://schemas.openxmlformats.org/markup-compatibility/2006">
-    <mc:Choice xmlns:p14="http://schemas.microsoft.com/office/powerpoint/2010/main" Requires="p14">
+  <mc:AlternateContent xmlns:mc="http://schemas.openxmlformats.org/markup-compatibility/2006" xmlns:p14="http://schemas.microsoft.com/office/powerpoint/2010/main">
+    <mc:Choice Requires="p14">
       <p:transition spd="slow" p14:dur="4000">
         <p14:vortex dir="u"/>
       </p:transition>
     </mc:Choice>
-    <mc:Fallback>
+    <mc:Fallback xmlns="">
       <p:transition spd="slow">
         <p:fade/>
       </p:transition>
@@ -7173,13 +7174,13 @@
   <p:clrMapOvr>
     <a:masterClrMapping/>
   </p:clrMapOvr>
-  <mc:AlternateContent xmlns:mc="http://schemas.openxmlformats.org/markup-compatibility/2006">
-    <mc:Choice xmlns:p14="http://schemas.microsoft.com/office/powerpoint/2010/main" Requires="p14">
+  <mc:AlternateContent xmlns:mc="http://schemas.openxmlformats.org/markup-compatibility/2006" xmlns:p14="http://schemas.microsoft.com/office/powerpoint/2010/main">
+    <mc:Choice Requires="p14">
       <p:transition spd="slow" p14:dur="4000">
         <p14:vortex dir="u"/>
       </p:transition>
     </mc:Choice>
-    <mc:Fallback>
+    <mc:Fallback xmlns="">
       <p:transition spd="slow">
         <p:fade/>
       </p:transition>
@@ -7541,13 +7542,13 @@
   <p:clrMapOvr>
     <a:masterClrMapping/>
   </p:clrMapOvr>
-  <mc:AlternateContent xmlns:mc="http://schemas.openxmlformats.org/markup-compatibility/2006">
-    <mc:Choice xmlns:p14="http://schemas.microsoft.com/office/powerpoint/2010/main" Requires="p14">
+  <mc:AlternateContent xmlns:mc="http://schemas.openxmlformats.org/markup-compatibility/2006" xmlns:p14="http://schemas.microsoft.com/office/powerpoint/2010/main">
+    <mc:Choice Requires="p14">
       <p:transition spd="slow" p14:dur="4000">
         <p14:vortex dir="u"/>
       </p:transition>
     </mc:Choice>
-    <mc:Fallback>
+    <mc:Fallback xmlns="">
       <p:transition spd="slow">
         <p:fade/>
       </p:transition>
@@ -8026,13 +8027,13 @@
   <p:clrMapOvr>
     <a:masterClrMapping/>
   </p:clrMapOvr>
-  <mc:AlternateContent xmlns:mc="http://schemas.openxmlformats.org/markup-compatibility/2006">
-    <mc:Choice xmlns:p14="http://schemas.microsoft.com/office/powerpoint/2010/main" Requires="p14">
+  <mc:AlternateContent xmlns:mc="http://schemas.openxmlformats.org/markup-compatibility/2006" xmlns:p14="http://schemas.microsoft.com/office/powerpoint/2010/main">
+    <mc:Choice Requires="p14">
       <p:transition spd="slow" p14:dur="4000">
         <p14:vortex dir="u"/>
       </p:transition>
     </mc:Choice>
-    <mc:Fallback>
+    <mc:Fallback xmlns="">
       <p:transition spd="slow">
         <p:fade/>
       </p:transition>
@@ -8627,13 +8628,13 @@
   <p:clrMapOvr>
     <a:masterClrMapping/>
   </p:clrMapOvr>
-  <mc:AlternateContent xmlns:mc="http://schemas.openxmlformats.org/markup-compatibility/2006">
-    <mc:Choice xmlns:p14="http://schemas.microsoft.com/office/powerpoint/2010/main" Requires="p14">
+  <mc:AlternateContent xmlns:mc="http://schemas.openxmlformats.org/markup-compatibility/2006" xmlns:p14="http://schemas.microsoft.com/office/powerpoint/2010/main">
+    <mc:Choice Requires="p14">
       <p:transition spd="slow" p14:dur="4000">
         <p14:vortex dir="u"/>
       </p:transition>
     </mc:Choice>
-    <mc:Fallback>
+    <mc:Fallback xmlns="">
       <p:transition spd="slow">
         <p:fade/>
       </p:transition>
@@ -8824,13 +8825,13 @@
   <p:clrMapOvr>
     <a:masterClrMapping/>
   </p:clrMapOvr>
-  <mc:AlternateContent xmlns:mc="http://schemas.openxmlformats.org/markup-compatibility/2006">
-    <mc:Choice xmlns:p14="http://schemas.microsoft.com/office/powerpoint/2010/main" Requires="p14">
+  <mc:AlternateContent xmlns:mc="http://schemas.openxmlformats.org/markup-compatibility/2006" xmlns:p14="http://schemas.microsoft.com/office/powerpoint/2010/main">
+    <mc:Choice Requires="p14">
       <p:transition spd="slow" p14:dur="4000">
         <p14:vortex dir="u"/>
       </p:transition>
     </mc:Choice>
-    <mc:Fallback>
+    <mc:Fallback xmlns="">
       <p:transition spd="slow">
         <p:fade/>
       </p:transition>
@@ -9060,13 +9061,13 @@
   <p:clrMapOvr>
     <a:masterClrMapping/>
   </p:clrMapOvr>
-  <mc:AlternateContent xmlns:mc="http://schemas.openxmlformats.org/markup-compatibility/2006">
-    <mc:Choice xmlns:p14="http://schemas.microsoft.com/office/powerpoint/2010/main" Requires="p14">
+  <mc:AlternateContent xmlns:mc="http://schemas.openxmlformats.org/markup-compatibility/2006" xmlns:p14="http://schemas.microsoft.com/office/powerpoint/2010/main">
+    <mc:Choice Requires="p14">
       <p:transition spd="slow" p14:dur="4000">
         <p14:vortex dir="u"/>
       </p:transition>
     </mc:Choice>
-    <mc:Fallback>
+    <mc:Fallback xmlns="">
       <p:transition spd="slow">
         <p:fade/>
       </p:transition>
@@ -9297,13 +9298,13 @@
   <p:clrMapOvr>
     <a:masterClrMapping/>
   </p:clrMapOvr>
-  <mc:AlternateContent xmlns:mc="http://schemas.openxmlformats.org/markup-compatibility/2006">
-    <mc:Choice xmlns:p14="http://schemas.microsoft.com/office/powerpoint/2010/main" Requires="p14">
+  <mc:AlternateContent xmlns:mc="http://schemas.openxmlformats.org/markup-compatibility/2006" xmlns:p14="http://schemas.microsoft.com/office/powerpoint/2010/main">
+    <mc:Choice Requires="p14">
       <p:transition spd="slow" p14:dur="4000">
         <p14:vortex dir="u"/>
       </p:transition>
     </mc:Choice>
-    <mc:Fallback>
+    <mc:Fallback xmlns="">
       <p:transition spd="slow">
         <p:fade/>
       </p:transition>
@@ -9556,13 +9557,13 @@
   <p:clrMapOvr>
     <a:masterClrMapping/>
   </p:clrMapOvr>
-  <mc:AlternateContent xmlns:mc="http://schemas.openxmlformats.org/markup-compatibility/2006">
-    <mc:Choice xmlns:p14="http://schemas.microsoft.com/office/powerpoint/2010/main" Requires="p14">
+  <mc:AlternateContent xmlns:mc="http://schemas.openxmlformats.org/markup-compatibility/2006" xmlns:p14="http://schemas.microsoft.com/office/powerpoint/2010/main">
+    <mc:Choice Requires="p14">
       <p:transition spd="slow" p14:dur="4000">
         <p14:vortex dir="u"/>
       </p:transition>
     </mc:Choice>
-    <mc:Fallback>
+    <mc:Fallback xmlns="">
       <p:transition spd="slow">
         <p:fade/>
       </p:transition>
@@ -10033,13 +10034,13 @@
   <p:clrMapOvr>
     <a:masterClrMapping/>
   </p:clrMapOvr>
-  <mc:AlternateContent xmlns:mc="http://schemas.openxmlformats.org/markup-compatibility/2006">
-    <mc:Choice xmlns:p14="http://schemas.microsoft.com/office/powerpoint/2010/main" Requires="p14">
+  <mc:AlternateContent xmlns:mc="http://schemas.openxmlformats.org/markup-compatibility/2006" xmlns:p14="http://schemas.microsoft.com/office/powerpoint/2010/main">
+    <mc:Choice Requires="p14">
       <p:transition spd="slow" p14:dur="4000">
         <p14:vortex dir="u"/>
       </p:transition>
     </mc:Choice>
-    <mc:Fallback>
+    <mc:Fallback xmlns="">
       <p:transition spd="slow">
         <p:fade/>
       </p:transition>
@@ -10565,13 +10566,13 @@
   <p:clrMapOvr>
     <a:masterClrMapping/>
   </p:clrMapOvr>
-  <mc:AlternateContent xmlns:mc="http://schemas.openxmlformats.org/markup-compatibility/2006">
-    <mc:Choice xmlns:p14="http://schemas.microsoft.com/office/powerpoint/2010/main" Requires="p14">
+  <mc:AlternateContent xmlns:mc="http://schemas.openxmlformats.org/markup-compatibility/2006" xmlns:p14="http://schemas.microsoft.com/office/powerpoint/2010/main">
+    <mc:Choice Requires="p14">
       <p:transition spd="slow" p14:dur="4000">
         <p14:vortex dir="u"/>
       </p:transition>
     </mc:Choice>
-    <mc:Fallback>
+    <mc:Fallback xmlns="">
       <p:transition spd="slow">
         <p:fade/>
       </p:transition>
@@ -10926,13 +10927,13 @@
   <p:clrMapOvr>
     <a:masterClrMapping/>
   </p:clrMapOvr>
-  <mc:AlternateContent xmlns:mc="http://schemas.openxmlformats.org/markup-compatibility/2006">
-    <mc:Choice xmlns:p14="http://schemas.microsoft.com/office/powerpoint/2010/main" Requires="p14">
+  <mc:AlternateContent xmlns:mc="http://schemas.openxmlformats.org/markup-compatibility/2006" xmlns:p14="http://schemas.microsoft.com/office/powerpoint/2010/main">
+    <mc:Choice Requires="p14">
       <p:transition spd="slow" p14:dur="4000">
         <p14:vortex dir="u"/>
       </p:transition>
     </mc:Choice>
-    <mc:Fallback>
+    <mc:Fallback xmlns="">
       <p:transition spd="slow">
         <p:fade/>
       </p:transition>
@@ -11312,13 +11313,13 @@
   <p:clrMapOvr>
     <a:masterClrMapping/>
   </p:clrMapOvr>
-  <mc:AlternateContent xmlns:mc="http://schemas.openxmlformats.org/markup-compatibility/2006">
-    <mc:Choice xmlns:p14="http://schemas.microsoft.com/office/powerpoint/2010/main" Requires="p14">
+  <mc:AlternateContent xmlns:mc="http://schemas.openxmlformats.org/markup-compatibility/2006" xmlns:p14="http://schemas.microsoft.com/office/powerpoint/2010/main">
+    <mc:Choice Requires="p14">
       <p:transition spd="slow" p14:dur="4000">
         <p14:vortex dir="u"/>
       </p:transition>
     </mc:Choice>
-    <mc:Fallback>
+    <mc:Fallback xmlns="">
       <p:transition spd="slow">
         <p:fade/>
       </p:transition>
@@ -11595,13 +11596,13 @@
   <p:clrMapOvr>
     <a:masterClrMapping/>
   </p:clrMapOvr>
-  <mc:AlternateContent xmlns:mc="http://schemas.openxmlformats.org/markup-compatibility/2006">
-    <mc:Choice xmlns:p14="http://schemas.microsoft.com/office/powerpoint/2010/main" Requires="p14">
+  <mc:AlternateContent xmlns:mc="http://schemas.openxmlformats.org/markup-compatibility/2006" xmlns:p14="http://schemas.microsoft.com/office/powerpoint/2010/main">
+    <mc:Choice Requires="p14">
       <p:transition spd="slow" p14:dur="4000">
         <p14:vortex dir="u"/>
       </p:transition>
     </mc:Choice>
-    <mc:Fallback>
+    <mc:Fallback xmlns="">
       <p:transition spd="slow">
         <p:fade/>
       </p:transition>
@@ -11846,6 +11847,96 @@
           </a:p>
         </p:txBody>
       </p:sp>
+      <p:sp>
+        <p:nvSpPr>
+          <p:cNvPr id="4" name="Tekstvak 3">
+            <a:extLst>
+              <a:ext uri="{FF2B5EF4-FFF2-40B4-BE49-F238E27FC236}">
+                <a16:creationId xmlns:a16="http://schemas.microsoft.com/office/drawing/2014/main" id="{0A92A93F-75D0-1B63-692F-48F517A28967}"/>
+              </a:ext>
+            </a:extLst>
+          </p:cNvPr>
+          <p:cNvSpPr txBox="1"/>
+          <p:nvPr/>
+        </p:nvSpPr>
+        <p:spPr>
+          <a:xfrm>
+            <a:off x="736022" y="4043795"/>
+            <a:ext cx="4727863" cy="1477328"/>
+          </a:xfrm>
+          <a:prstGeom prst="rect">
+            <a:avLst/>
+          </a:prstGeom>
+          <a:noFill/>
+        </p:spPr>
+        <p:txBody>
+          <a:bodyPr rot="0" spcFirstLastPara="0" vertOverflow="overflow" horzOverflow="overflow" vert="horz" wrap="square" lIns="91440" tIns="45720" rIns="91440" bIns="45720" numCol="1" spcCol="0" rtlCol="0" fromWordArt="0" anchor="t" anchorCtr="0" forceAA="0" compatLnSpc="1">
+            <a:prstTxWarp prst="textNoShape">
+              <a:avLst/>
+            </a:prstTxWarp>
+            <a:spAutoFit/>
+          </a:bodyPr>
+          <a:lstStyle/>
+          <a:p>
+            <a:r>
+              <a:rPr lang="nl-NL" dirty="0"/>
+              <a:t>PDO doorloopt stapsgewijs:</a:t>
+            </a:r>
+          </a:p>
+          <a:p>
+            <a:pPr marL="285750" indent="-285750">
+              <a:buFont typeface="Calibri"/>
+              <a:buChar char="-"/>
+            </a:pPr>
+            <a:r>
+              <a:rPr lang="nl-NL" dirty="0" err="1"/>
+              <a:t>Prepare</a:t>
+            </a:r>
+          </a:p>
+          <a:p>
+            <a:pPr marL="285750" indent="-285750">
+              <a:buFont typeface="Calibri"/>
+              <a:buChar char="-"/>
+            </a:pPr>
+            <a:r>
+              <a:rPr lang="nl-NL" dirty="0"/>
+              <a:t>Bind</a:t>
+            </a:r>
+          </a:p>
+          <a:p>
+            <a:pPr marL="285750" indent="-285750">
+              <a:buFont typeface="Calibri"/>
+              <a:buChar char="-"/>
+            </a:pPr>
+            <a:r>
+              <a:rPr lang="nl-NL" dirty="0" err="1"/>
+              <a:t>Execute</a:t>
+            </a:r>
+          </a:p>
+          <a:p>
+            <a:pPr marL="285750" indent="-285750">
+              <a:buFont typeface="Calibri"/>
+              <a:buChar char="-"/>
+            </a:pPr>
+            <a:r>
+              <a:rPr lang="nl-NL" dirty="0"/>
+              <a:t>Optioneel: </a:t>
+            </a:r>
+            <a:r>
+              <a:rPr lang="nl-NL" dirty="0" err="1"/>
+              <a:t>Fetch</a:t>
+            </a:r>
+            <a:r>
+              <a:rPr lang="nl-NL" dirty="0"/>
+              <a:t> / </a:t>
+            </a:r>
+            <a:r>
+              <a:rPr lang="nl-NL" dirty="0" err="1"/>
+              <a:t>FetchAll</a:t>
+            </a:r>
+          </a:p>
+        </p:txBody>
+      </p:sp>
     </p:spTree>
     <p:extLst>
       <p:ext uri="{BB962C8B-B14F-4D97-AF65-F5344CB8AC3E}">
@@ -11856,13 +11947,13 @@
   <p:clrMapOvr>
     <a:masterClrMapping/>
   </p:clrMapOvr>
-  <mc:AlternateContent xmlns:mc="http://schemas.openxmlformats.org/markup-compatibility/2006">
-    <mc:Choice xmlns:p14="http://schemas.microsoft.com/office/powerpoint/2010/main" Requires="p14">
+  <mc:AlternateContent xmlns:mc="http://schemas.openxmlformats.org/markup-compatibility/2006" xmlns:p14="http://schemas.microsoft.com/office/powerpoint/2010/main">
+    <mc:Choice Requires="p14">
       <p:transition spd="slow" p14:dur="4000">
         <p14:vortex dir="u"/>
       </p:transition>
     </mc:Choice>
-    <mc:Fallback>
+    <mc:Fallback xmlns="">
       <p:transition spd="slow">
         <p:fade/>
       </p:transition>
@@ -12053,13 +12144,13 @@
   <p:clrMapOvr>
     <a:masterClrMapping/>
   </p:clrMapOvr>
-  <mc:AlternateContent xmlns:mc="http://schemas.openxmlformats.org/markup-compatibility/2006">
-    <mc:Choice xmlns:p14="http://schemas.microsoft.com/office/powerpoint/2010/main" Requires="p14">
+  <mc:AlternateContent xmlns:mc="http://schemas.openxmlformats.org/markup-compatibility/2006" xmlns:p14="http://schemas.microsoft.com/office/powerpoint/2010/main">
+    <mc:Choice Requires="p14">
       <p:transition spd="slow" p14:dur="4000">
         <p14:vortex dir="u"/>
       </p:transition>
     </mc:Choice>
-    <mc:Fallback>
+    <mc:Fallback xmlns="">
       <p:transition spd="slow">
         <p:fade/>
       </p:transition>
@@ -12271,13 +12362,13 @@
   <p:clrMapOvr>
     <a:masterClrMapping/>
   </p:clrMapOvr>
-  <mc:AlternateContent xmlns:mc="http://schemas.openxmlformats.org/markup-compatibility/2006">
-    <mc:Choice xmlns:p14="http://schemas.microsoft.com/office/powerpoint/2010/main" Requires="p14">
+  <mc:AlternateContent xmlns:mc="http://schemas.openxmlformats.org/markup-compatibility/2006" xmlns:p14="http://schemas.microsoft.com/office/powerpoint/2010/main">
+    <mc:Choice Requires="p14">
       <p:transition spd="slow" p14:dur="4000">
         <p14:vortex dir="u"/>
       </p:transition>
     </mc:Choice>
-    <mc:Fallback>
+    <mc:Fallback xmlns="">
       <p:transition spd="slow">
         <p:fade/>
       </p:transition>
@@ -12523,13 +12614,13 @@
   <p:clrMapOvr>
     <a:masterClrMapping/>
   </p:clrMapOvr>
-  <mc:AlternateContent xmlns:mc="http://schemas.openxmlformats.org/markup-compatibility/2006">
-    <mc:Choice xmlns:p14="http://schemas.microsoft.com/office/powerpoint/2010/main" Requires="p14">
+  <mc:AlternateContent xmlns:mc="http://schemas.openxmlformats.org/markup-compatibility/2006" xmlns:p14="http://schemas.microsoft.com/office/powerpoint/2010/main">
+    <mc:Choice Requires="p14">
       <p:transition spd="slow" p14:dur="4000">
         <p14:vortex dir="u"/>
       </p:transition>
     </mc:Choice>
-    <mc:Fallback>
+    <mc:Fallback xmlns="">
       <p:transition spd="slow">
         <p:fade/>
       </p:transition>
@@ -12916,13 +13007,13 @@
   <p:clrMapOvr>
     <a:masterClrMapping/>
   </p:clrMapOvr>
-  <mc:AlternateContent xmlns:mc="http://schemas.openxmlformats.org/markup-compatibility/2006">
-    <mc:Choice xmlns:p14="http://schemas.microsoft.com/office/powerpoint/2010/main" Requires="p14">
+  <mc:AlternateContent xmlns:mc="http://schemas.openxmlformats.org/markup-compatibility/2006" xmlns:p14="http://schemas.microsoft.com/office/powerpoint/2010/main">
+    <mc:Choice Requires="p14">
       <p:transition spd="slow" p14:dur="4000">
         <p14:vortex dir="u"/>
       </p:transition>
     </mc:Choice>
-    <mc:Fallback>
+    <mc:Fallback xmlns="">
       <p:transition spd="slow">
         <p:fade/>
       </p:transition>

</xml_diff>